<commit_message>
fix unit test done
</commit_message>
<xml_diff>
--- a/DsDotNet/src/UnitTest/UnitTest.Engine/ImportOffice/ppt/T5_Call.pptx
+++ b/DsDotNet/src/UnitTest/UnitTest.Engine/ImportOffice/ppt/T5_Call.pptx
@@ -218,7 +218,7 @@
           <a:p>
             <a:fld id="{DD503887-5801-43A0-AEF9-041E8DDC2558}" type="datetimeFigureOut">
               <a:rPr lang="ko-KR" altLang="en-US" smtClean="0"/>
-              <a:t>2022-12-20</a:t>
+              <a:t>2023-01-13</a:t>
             </a:fld>
             <a:endParaRPr lang="ko-KR" altLang="en-US"/>
           </a:p>
@@ -395,7 +395,7 @@
           <a:p>
             <a:fld id="{95336A0E-57B1-4D4C-BD9B-2F72B5943464}" type="datetimeFigureOut">
               <a:rPr lang="ko-KR" altLang="en-US" smtClean="0"/>
-              <a:t>2022-12-20</a:t>
+              <a:t>2023-01-13</a:t>
             </a:fld>
             <a:endParaRPr lang="ko-KR" altLang="en-US"/>
           </a:p>
@@ -757,7 +757,7 @@
           <a:effectLst/>
           <a:extLst>
             <a:ext uri="{91240B29-F687-4f45-9708-019B960494DF}">
-              <a14:hiddenLine xmlns="" xmlns:a14="http://schemas.microsoft.com/office/drawing/2010/main" w="9525">
+              <a14:hiddenLine xmlns:a14="http://schemas.microsoft.com/office/drawing/2010/main" xmlns="" w="9525">
                 <a:solidFill>
                   <a:srgbClr val="000000"/>
                 </a:solidFill>
@@ -949,7 +949,7 @@
           <a:p>
             <a:fld id="{DEA6EBF0-8E22-42A7-9BEA-2AC7066E6498}" type="datetimeFigureOut">
               <a:rPr lang="ko-KR" altLang="en-US" smtClean="0"/>
-              <a:t>2022-12-20</a:t>
+              <a:t>2023-01-13</a:t>
             </a:fld>
             <a:endParaRPr lang="ko-KR" altLang="en-US"/>
           </a:p>
@@ -1267,7 +1267,7 @@
           <a:p>
             <a:fld id="{DEA6EBF0-8E22-42A7-9BEA-2AC7066E6498}" type="datetimeFigureOut">
               <a:rPr lang="ko-KR" altLang="en-US" smtClean="0"/>
-              <a:t>2022-12-20</a:t>
+              <a:t>2023-01-13</a:t>
             </a:fld>
             <a:endParaRPr lang="ko-KR" altLang="en-US"/>
           </a:p>
@@ -1755,7 +1755,7 @@
           <a:p>
             <a:fld id="{DEA6EBF0-8E22-42A7-9BEA-2AC7066E6498}" type="datetimeFigureOut">
               <a:rPr lang="ko-KR" altLang="en-US" smtClean="0"/>
-              <a:t>2022-12-20</a:t>
+              <a:t>2023-01-13</a:t>
             </a:fld>
             <a:endParaRPr lang="ko-KR" altLang="en-US"/>
           </a:p>
@@ -2124,7 +2124,7 @@
           <a:p>
             <a:fld id="{DEA6EBF0-8E22-42A7-9BEA-2AC7066E6498}" type="datetimeFigureOut">
               <a:rPr lang="ko-KR" altLang="en-US" smtClean="0"/>
-              <a:t>2022-12-20</a:t>
+              <a:t>2023-01-13</a:t>
             </a:fld>
             <a:endParaRPr lang="ko-KR" altLang="en-US"/>
           </a:p>
@@ -2279,7 +2279,7 @@
           <a:ln/>
           <a:extLst>
             <a:ext uri="{91240B29-F687-4f45-9708-019B960494DF}">
-              <a14:hiddenLine xmlns="" xmlns:a14="http://schemas.microsoft.com/office/drawing/2010/main" w="9525">
+              <a14:hiddenLine xmlns:a14="http://schemas.microsoft.com/office/drawing/2010/main" xmlns="" w="9525">
                 <a:solidFill>
                   <a:srgbClr val="000000"/>
                 </a:solidFill>
@@ -2397,7 +2397,7 @@
           <a:p>
             <a:fld id="{DEA6EBF0-8E22-42A7-9BEA-2AC7066E6498}" type="datetimeFigureOut">
               <a:rPr lang="ko-KR" altLang="en-US" smtClean="0"/>
-              <a:t>2022-12-20</a:t>
+              <a:t>2023-01-13</a:t>
             </a:fld>
             <a:endParaRPr lang="ko-KR" altLang="en-US"/>
           </a:p>
@@ -2554,7 +2554,7 @@
           <a:ln/>
           <a:extLst>
             <a:ext uri="{91240B29-F687-4f45-9708-019B960494DF}">
-              <a14:hiddenLine xmlns="" xmlns:a14="http://schemas.microsoft.com/office/drawing/2010/main" w="9525">
+              <a14:hiddenLine xmlns:a14="http://schemas.microsoft.com/office/drawing/2010/main" xmlns="" w="9525">
                 <a:solidFill>
                   <a:srgbClr val="000000"/>
                 </a:solidFill>
@@ -2682,7 +2682,7 @@
           <a:p>
             <a:fld id="{DEA6EBF0-8E22-42A7-9BEA-2AC7066E6498}" type="datetimeFigureOut">
               <a:rPr lang="ko-KR" altLang="en-US" smtClean="0"/>
-              <a:t>2022-12-20</a:t>
+              <a:t>2023-01-13</a:t>
             </a:fld>
             <a:endParaRPr lang="ko-KR" altLang="en-US"/>
           </a:p>
@@ -2800,7 +2800,7 @@
           <a:p>
             <a:fld id="{DEA6EBF0-8E22-42A7-9BEA-2AC7066E6498}" type="datetimeFigureOut">
               <a:rPr lang="ko-KR" altLang="en-US" smtClean="0"/>
-              <a:t>2022-12-20</a:t>
+              <a:t>2023-01-13</a:t>
             </a:fld>
             <a:endParaRPr lang="ko-KR" altLang="en-US"/>
           </a:p>
@@ -2955,7 +2955,7 @@
           <a:ln/>
           <a:extLst>
             <a:ext uri="{91240B29-F687-4f45-9708-019B960494DF}">
-              <a14:hiddenLine xmlns="" xmlns:a14="http://schemas.microsoft.com/office/drawing/2010/main" w="9525">
+              <a14:hiddenLine xmlns:a14="http://schemas.microsoft.com/office/drawing/2010/main" xmlns="" w="9525">
                 <a:solidFill>
                   <a:srgbClr val="000000"/>
                 </a:solidFill>
@@ -3083,7 +3083,7 @@
           <a:p>
             <a:fld id="{DEA6EBF0-8E22-42A7-9BEA-2AC7066E6498}" type="datetimeFigureOut">
               <a:rPr lang="ko-KR" altLang="en-US" smtClean="0"/>
-              <a:t>2022-12-20</a:t>
+              <a:t>2023-01-13</a:t>
             </a:fld>
             <a:endParaRPr lang="ko-KR" altLang="en-US"/>
           </a:p>
@@ -3426,7 +3426,7 @@
           <a:p>
             <a:fld id="{DEA6EBF0-8E22-42A7-9BEA-2AC7066E6498}" type="datetimeFigureOut">
               <a:rPr lang="ko-KR" altLang="en-US" smtClean="0"/>
-              <a:t>2022-12-20</a:t>
+              <a:t>2023-01-13</a:t>
             </a:fld>
             <a:endParaRPr lang="ko-KR" altLang="en-US"/>
           </a:p>
@@ -3581,7 +3581,7 @@
           <a:ln/>
           <a:extLst>
             <a:ext uri="{91240B29-F687-4f45-9708-019B960494DF}">
-              <a14:hiddenLine xmlns="" xmlns:a14="http://schemas.microsoft.com/office/drawing/2010/main" w="9525">
+              <a14:hiddenLine xmlns:a14="http://schemas.microsoft.com/office/drawing/2010/main" xmlns="" w="9525">
                 <a:solidFill>
                   <a:srgbClr val="000000"/>
                 </a:solidFill>
@@ -3765,7 +3765,7 @@
           <a:p>
             <a:fld id="{DEA6EBF0-8E22-42A7-9BEA-2AC7066E6498}" type="datetimeFigureOut">
               <a:rPr lang="ko-KR" altLang="en-US" smtClean="0"/>
-              <a:t>2022-12-20</a:t>
+              <a:t>2023-01-13</a:t>
             </a:fld>
             <a:endParaRPr lang="ko-KR" altLang="en-US"/>
           </a:p>
@@ -3920,7 +3920,7 @@
           <a:ln/>
           <a:extLst>
             <a:ext uri="{91240B29-F687-4f45-9708-019B960494DF}">
-              <a14:hiddenLine xmlns="" xmlns:a14="http://schemas.microsoft.com/office/drawing/2010/main" w="9525">
+              <a14:hiddenLine xmlns:a14="http://schemas.microsoft.com/office/drawing/2010/main" xmlns="" w="9525">
                 <a:solidFill>
                   <a:srgbClr val="000000"/>
                 </a:solidFill>
@@ -4242,7 +4242,7 @@
           <a:p>
             <a:fld id="{DEA6EBF0-8E22-42A7-9BEA-2AC7066E6498}" type="datetimeFigureOut">
               <a:rPr lang="ko-KR" altLang="en-US" smtClean="0"/>
-              <a:t>2022-12-20</a:t>
+              <a:t>2023-01-13</a:t>
             </a:fld>
             <a:endParaRPr lang="ko-KR" altLang="en-US"/>
           </a:p>
@@ -4337,7 +4337,7 @@
           <a:p>
             <a:fld id="{DEA6EBF0-8E22-42A7-9BEA-2AC7066E6498}" type="datetimeFigureOut">
               <a:rPr lang="ko-KR" altLang="en-US" smtClean="0"/>
-              <a:t>2022-12-20</a:t>
+              <a:t>2023-01-13</a:t>
             </a:fld>
             <a:endParaRPr lang="ko-KR" altLang="en-US"/>
           </a:p>
@@ -4605,7 +4605,7 @@
           <a:ln/>
           <a:extLst>
             <a:ext uri="{91240B29-F687-4f45-9708-019B960494DF}">
-              <a14:hiddenLine xmlns="" xmlns:a14="http://schemas.microsoft.com/office/drawing/2010/main" w="9525">
+              <a14:hiddenLine xmlns:a14="http://schemas.microsoft.com/office/drawing/2010/main" xmlns="" w="9525">
                 <a:solidFill>
                   <a:srgbClr val="000000"/>
                 </a:solidFill>
@@ -4804,7 +4804,7 @@
           <a:p>
             <a:fld id="{DEA6EBF0-8E22-42A7-9BEA-2AC7066E6498}" type="datetimeFigureOut">
               <a:rPr lang="ko-KR" altLang="en-US" smtClean="0"/>
-              <a:t>2022-12-20</a:t>
+              <a:t>2023-01-13</a:t>
             </a:fld>
             <a:endParaRPr lang="ko-KR" altLang="en-US"/>
           </a:p>
@@ -5117,7 +5117,7 @@
           <a:p>
             <a:fld id="{DEA6EBF0-8E22-42A7-9BEA-2AC7066E6498}" type="datetimeFigureOut">
               <a:rPr lang="ko-KR" altLang="en-US" smtClean="0"/>
-              <a:t>2022-12-20</a:t>
+              <a:t>2023-01-13</a:t>
             </a:fld>
             <a:endParaRPr lang="ko-KR" altLang="en-US"/>
           </a:p>
@@ -5387,7 +5387,7 @@
           <a:p>
             <a:fld id="{DEA6EBF0-8E22-42A7-9BEA-2AC7066E6498}" type="datetimeFigureOut">
               <a:rPr lang="ko-KR" altLang="en-US" smtClean="0"/>
-              <a:t>2022-12-20</a:t>
+              <a:t>2023-01-13</a:t>
             </a:fld>
             <a:endParaRPr lang="ko-KR" altLang="en-US"/>
           </a:p>
@@ -6459,7 +6459,7 @@
             <a:pPr algn="ctr"/>
             <a:r>
               <a:rPr lang="en-US" altLang="ko-KR" dirty="0"/>
-              <a:t>../sample/Lib/test </a:t>
+              <a:t>../sample/Lib/tester </a:t>
             </a:r>
           </a:p>
           <a:p>
@@ -7008,7 +7008,7 @@
             <a:pPr algn="ctr"/>
             <a:r>
               <a:rPr lang="en-US" altLang="ko-KR" dirty="0"/>
-              <a:t>../sample/Lib/test </a:t>
+              <a:t>../sample/Lib/tester </a:t>
             </a:r>
           </a:p>
           <a:p>
@@ -7557,7 +7557,7 @@
             <a:pPr algn="ctr"/>
             <a:r>
               <a:rPr lang="en-US" altLang="ko-KR" dirty="0"/>
-              <a:t>../sample/Lib/test </a:t>
+              <a:t>../sample/Lib/tester </a:t>
             </a:r>
           </a:p>
           <a:p>

</xml_diff>